<commit_message>
include work on tls-sharp
</commit_message>
<xml_diff>
--- a/hackathon-presentation-ietf105_tls13_ssh_sce_ma_dscp_le_phb.pptx
+++ b/hackathon-presentation-ietf105_tls13_ssh_sce_ma_dscp_le_phb.pptx
@@ -197,7 +197,7 @@
           <a:bodyPr lIns="0" rIns="0" tIns="0" bIns="0" anchor="b"/>
           <a:p>
             <a:pPr algn="r"/>
-            <a:fld id="{4794976E-12F7-4381-B983-B66D3CBA4635}" type="slidenum">
+            <a:fld id="{A9414B94-6B7A-4EFC-B0B5-A1C058EAC24B}" type="slidenum">
               <a:rPr b="0" lang="en-US" sz="1400" spc="-1" strike="noStrike">
                 <a:latin typeface="Times New Roman"/>
               </a:rPr>
@@ -287,7 +287,7 @@
                 <a:spcPct val="100000"/>
               </a:lnSpc>
             </a:pPr>
-            <a:fld id="{C05907E5-374F-48E8-A459-7EAB87329E0D}" type="slidenum">
+            <a:fld id="{3F8B90CE-0736-431D-989C-F8CBBF291493}" type="slidenum">
               <a:rPr b="0" lang="en-US" sz="1800" spc="-1" strike="noStrike">
                 <a:solidFill>
                   <a:srgbClr val="000000"/>
@@ -3405,17 +3405,7 @@
                 <a:latin typeface="Calibri"/>
                 <a:ea typeface="Calibri"/>
               </a:rPr>
-              <a:t>Body Level </a:t>
-            </a:r>
-            <a:r>
-              <a:rPr b="0" lang="en-US" sz="3200" spc="-1" strike="noStrike">
-                <a:solidFill>
-                  <a:srgbClr val="888888"/>
-                </a:solidFill>
-                <a:latin typeface="Calibri"/>
-                <a:ea typeface="Calibri"/>
-              </a:rPr>
-              <a:t>Five</a:t>
+              <a:t>Body Level Five</a:t>
             </a:r>
             <a:endParaRPr b="0" lang="en-US" sz="3200" spc="-1" strike="noStrike">
               <a:solidFill>
@@ -3453,7 +3443,7 @@
                 <a:spcPct val="100000"/>
               </a:lnSpc>
             </a:pPr>
-            <a:fld id="{0AC63EDF-CD4B-465B-83E8-4D769E61E01D}" type="slidenum">
+            <a:fld id="{B634E919-315F-4497-9997-1F25D200C324}" type="slidenum">
               <a:rPr b="0" lang="en-US" sz="1200" spc="-1" strike="noStrike">
                 <a:solidFill>
                   <a:srgbClr val="888888"/>
@@ -3813,7 +3803,7 @@
                 <a:spcPct val="100000"/>
               </a:lnSpc>
             </a:pPr>
-            <a:fld id="{816EA33F-9F1F-49F8-8D16-33CAB413E801}" type="slidenum">
+            <a:fld id="{6A69E7F5-E01D-4819-B760-2D571A8EA5A5}" type="slidenum">
               <a:rPr b="0" lang="en-US" sz="1200" spc="-1" strike="noStrike">
                 <a:solidFill>
                   <a:srgbClr val="888888"/>
@@ -4388,7 +4378,7 @@
                 <a:spcPct val="100000"/>
               </a:lnSpc>
             </a:pPr>
-            <a:fld id="{903943BA-C3A2-4288-8392-0E8716938668}" type="slidenum">
+            <a:fld id="{AFC55349-F9C4-4A57-AEEF-69719A771ABA}" type="slidenum">
               <a:rPr b="0" lang="en-US" sz="1200" spc="-1" strike="noStrike">
                 <a:solidFill>
                   <a:srgbClr val="888888"/>
@@ -4552,6 +4542,37 @@
             </a:endParaRPr>
           </a:p>
           <a:p>
+            <a:pPr marL="189360" indent="-189000">
+              <a:lnSpc>
+                <a:spcPct val="90000"/>
+              </a:lnSpc>
+              <a:spcBef>
+                <a:spcPts val="499"/>
+              </a:spcBef>
+              <a:buClr>
+                <a:srgbClr val="000000"/>
+              </a:buClr>
+              <a:buFont typeface="Arial"/>
+              <a:buChar char="•"/>
+            </a:pPr>
+            <a:r>
+              <a:rPr b="0" lang="en-US" sz="2400" spc="-1" strike="noStrike">
+                <a:solidFill>
+                  <a:srgbClr val="000000"/>
+                </a:solidFill>
+                <a:latin typeface="Calibri"/>
+                <a:ea typeface="Calibri"/>
+              </a:rPr>
+              <a:t>TLS-Sharp got refactored (wip)</a:t>
+            </a:r>
+            <a:endParaRPr b="0" lang="en-US" sz="2400" spc="-1" strike="noStrike">
+              <a:solidFill>
+                <a:srgbClr val="000000"/>
+              </a:solidFill>
+              <a:latin typeface="Calibri"/>
+            </a:endParaRPr>
+          </a:p>
+          <a:p>
             <a:pPr lvl="1" marL="646560" indent="-189000">
               <a:lnSpc>
                 <a:spcPct val="90000"/>
@@ -4722,7 +4743,7 @@
                 <a:spcPct val="100000"/>
               </a:lnSpc>
             </a:pPr>
-            <a:fld id="{FE472BFB-2BCE-4E05-A00B-2AD3FE19A516}" type="slidenum">
+            <a:fld id="{765F1D2A-E985-41F7-8D4B-87F9307489B3}" type="slidenum">
               <a:rPr b="0" lang="en-US" sz="1200" spc="-1" strike="noStrike">
                 <a:solidFill>
                   <a:srgbClr val="888888"/>
@@ -4976,7 +4997,7 @@
                 <a:spcPct val="100000"/>
               </a:lnSpc>
             </a:pPr>
-            <a:fld id="{2134CF17-6904-4848-BF6A-47413C3AF44E}" type="slidenum">
+            <a:fld id="{85B0DB76-8854-4531-8944-EDEA5BF93F59}" type="slidenum">
               <a:rPr b="0" lang="en-US" sz="1200" spc="-1" strike="noStrike">
                 <a:solidFill>
                   <a:srgbClr val="888888"/>
@@ -5147,7 +5168,7 @@
               </a:spcBef>
             </a:pPr>
             <a:r>
-              <a:rPr b="0" lang="en-US" sz="2400" spc="-1" strike="noStrike">
+              <a:rPr b="0" lang="en-US" sz="2200" spc="-1" strike="noStrike">
                 <a:solidFill>
                   <a:srgbClr val="000000"/>
                 </a:solidFill>
@@ -5156,7 +5177,7 @@
               </a:rPr>
               <a:t>Codarren Velvindron</a:t>
             </a:r>
-            <a:endParaRPr b="0" lang="en-US" sz="2400" spc="-1" strike="noStrike">
+            <a:endParaRPr b="0" lang="en-US" sz="2200" spc="-1" strike="noStrike">
               <a:solidFill>
                 <a:srgbClr val="000000"/>
               </a:solidFill>
@@ -5173,7 +5194,7 @@
               </a:spcBef>
             </a:pPr>
             <a:r>
-              <a:rPr b="0" lang="en-US" sz="2400" spc="-1" strike="noStrike">
+              <a:rPr b="0" lang="en-US" sz="2200" spc="-1" strike="noStrike">
                 <a:solidFill>
                   <a:srgbClr val="000000"/>
                 </a:solidFill>
@@ -5182,7 +5203,7 @@
               </a:rPr>
               <a:t>Bruno Bernard</a:t>
             </a:r>
-            <a:endParaRPr b="0" lang="en-US" sz="2400" spc="-1" strike="noStrike">
+            <a:endParaRPr b="0" lang="en-US" sz="2200" spc="-1" strike="noStrike">
               <a:solidFill>
                 <a:srgbClr val="000000"/>
               </a:solidFill>
@@ -5199,7 +5220,7 @@
               </a:spcBef>
             </a:pPr>
             <a:r>
-              <a:rPr b="0" lang="en-US" sz="2200" spc="-1" strike="noStrike">
+              <a:rPr b="0" lang="en-US" sz="2000" spc="-1" strike="noStrike">
                 <a:solidFill>
                   <a:srgbClr val="000000"/>
                 </a:solidFill>
@@ -5208,7 +5229,7 @@
               </a:rPr>
               <a:t>Jagveer Loky</a:t>
             </a:r>
-            <a:endParaRPr b="0" lang="en-US" sz="2200" spc="-1" strike="noStrike">
+            <a:endParaRPr b="0" lang="en-US" sz="2000" spc="-1" strike="noStrike">
               <a:solidFill>
                 <a:srgbClr val="000000"/>
               </a:solidFill>
@@ -5225,7 +5246,7 @@
               </a:spcBef>
             </a:pPr>
             <a:r>
-              <a:rPr b="0" lang="en-US" sz="2200" spc="-1" strike="noStrike">
+              <a:rPr b="0" lang="en-US" sz="2000" spc="-1" strike="noStrike">
                 <a:solidFill>
                   <a:srgbClr val="000000"/>
                 </a:solidFill>
@@ -5234,7 +5255,7 @@
               </a:rPr>
               <a:t>Kishan Takoordyal</a:t>
             </a:r>
-            <a:endParaRPr b="0" lang="en-US" sz="2200" spc="-1" strike="noStrike">
+            <a:endParaRPr b="0" lang="en-US" sz="2000" spc="-1" strike="noStrike">
               <a:solidFill>
                 <a:srgbClr val="000000"/>
               </a:solidFill>
@@ -5251,7 +5272,7 @@
               </a:spcBef>
             </a:pPr>
             <a:r>
-              <a:rPr b="0" lang="en-US" sz="2200" spc="-1" strike="noStrike">
+              <a:rPr b="0" lang="en-US" sz="2000" spc="-1" strike="noStrike">
                 <a:solidFill>
                   <a:srgbClr val="000000"/>
                 </a:solidFill>
@@ -5260,7 +5281,7 @@
               </a:rPr>
               <a:t>Jaykishan Mutkawoa</a:t>
             </a:r>
-            <a:endParaRPr b="0" lang="en-US" sz="2200" spc="-1" strike="noStrike">
+            <a:endParaRPr b="0" lang="en-US" sz="2000" spc="-1" strike="noStrike">
               <a:solidFill>
                 <a:srgbClr val="000000"/>
               </a:solidFill>
@@ -5277,7 +5298,7 @@
               </a:spcBef>
             </a:pPr>
             <a:r>
-              <a:rPr b="0" lang="en-US" sz="2200" spc="-1" strike="noStrike">
+              <a:rPr b="0" lang="en-US" sz="2000" spc="-1" strike="noStrike">
                 <a:solidFill>
                   <a:srgbClr val="000000"/>
                 </a:solidFill>
@@ -5286,7 +5307,7 @@
               </a:rPr>
               <a:t>Nathan Sunil Mangar</a:t>
             </a:r>
-            <a:endParaRPr b="0" lang="en-US" sz="2200" spc="-1" strike="noStrike">
+            <a:endParaRPr b="0" lang="en-US" sz="2000" spc="-1" strike="noStrike">
               <a:solidFill>
                 <a:srgbClr val="000000"/>
               </a:solidFill>
@@ -5303,7 +5324,7 @@
               </a:spcBef>
             </a:pPr>
             <a:r>
-              <a:rPr b="0" lang="en-US" sz="2200" spc="-1" strike="noStrike">
+              <a:rPr b="0" lang="en-US" sz="2000" spc="-1" strike="noStrike">
                 <a:solidFill>
                   <a:srgbClr val="000000"/>
                 </a:solidFill>
@@ -5312,7 +5333,7 @@
               </a:rPr>
               <a:t>Veegish Ramdani</a:t>
             </a:r>
-            <a:endParaRPr b="0" lang="en-US" sz="2200" spc="-1" strike="noStrike">
+            <a:endParaRPr b="0" lang="en-US" sz="2000" spc="-1" strike="noStrike">
               <a:solidFill>
                 <a:srgbClr val="000000"/>
               </a:solidFill>
@@ -5329,7 +5350,7 @@
               </a:spcBef>
             </a:pPr>
             <a:r>
-              <a:rPr b="0" lang="en-US" sz="2200" spc="-1" strike="noStrike">
+              <a:rPr b="0" lang="en-US" sz="2000" spc="-1" strike="noStrike">
                 <a:solidFill>
                   <a:srgbClr val="000000"/>
                 </a:solidFill>
@@ -5338,7 +5359,7 @@
               </a:rPr>
               <a:t>Jeremie Daniel</a:t>
             </a:r>
-            <a:endParaRPr b="0" lang="en-US" sz="2200" spc="-1" strike="noStrike">
+            <a:endParaRPr b="0" lang="en-US" sz="2000" spc="-1" strike="noStrike">
               <a:solidFill>
                 <a:srgbClr val="000000"/>
               </a:solidFill>
@@ -5355,7 +5376,7 @@
               </a:spcBef>
             </a:pPr>
             <a:r>
-              <a:rPr b="0" lang="en-US" sz="2200" spc="-1" strike="noStrike">
+              <a:rPr b="0" lang="en-US" sz="2000" spc="-1" strike="noStrike">
                 <a:solidFill>
                   <a:srgbClr val="000000"/>
                 </a:solidFill>
@@ -5364,7 +5385,7 @@
               </a:rPr>
               <a:t>Loganaden Velvindron</a:t>
             </a:r>
-            <a:endParaRPr b="0" lang="en-US" sz="2200" spc="-1" strike="noStrike">
+            <a:endParaRPr b="0" lang="en-US" sz="2000" spc="-1" strike="noStrike">
               <a:solidFill>
                 <a:srgbClr val="000000"/>
               </a:solidFill>
@@ -5380,7 +5401,17 @@
                 <a:spcPts val="499"/>
               </a:spcBef>
             </a:pPr>
-            <a:endParaRPr b="0" lang="en-US" sz="2200" spc="-1" strike="noStrike">
+            <a:r>
+              <a:rPr b="0" lang="en-US" sz="2000" spc="-1" strike="noStrike">
+                <a:solidFill>
+                  <a:srgbClr val="000000"/>
+                </a:solidFill>
+                <a:latin typeface="Calibri"/>
+                <a:ea typeface="Calibri"/>
+              </a:rPr>
+              <a:t>Muzaffar Auhammud</a:t>
+            </a:r>
+            <a:endParaRPr b="0" lang="en-US" sz="2000" spc="-1" strike="noStrike">
               <a:solidFill>
                 <a:srgbClr val="000000"/>
               </a:solidFill>
@@ -5396,7 +5427,7 @@
                 <a:spcPts val="499"/>
               </a:spcBef>
             </a:pPr>
-            <a:endParaRPr b="0" lang="en-US" sz="2200" spc="-1" strike="noStrike">
+            <a:endParaRPr b="0" lang="en-US" sz="2000" spc="-1" strike="noStrike">
               <a:solidFill>
                 <a:srgbClr val="000000"/>
               </a:solidFill>
@@ -5412,7 +5443,7 @@
                 <a:spcPts val="499"/>
               </a:spcBef>
             </a:pPr>
-            <a:endParaRPr b="0" lang="en-US" sz="2200" spc="-1" strike="noStrike">
+            <a:endParaRPr b="0" lang="en-US" sz="2000" spc="-1" strike="noStrike">
               <a:solidFill>
                 <a:srgbClr val="000000"/>
               </a:solidFill>
@@ -5428,7 +5459,7 @@
                 <a:spcPts val="499"/>
               </a:spcBef>
             </a:pPr>
-            <a:endParaRPr b="0" lang="en-US" sz="2200" spc="-1" strike="noStrike">
+            <a:endParaRPr b="0" lang="en-US" sz="2000" spc="-1" strike="noStrike">
               <a:solidFill>
                 <a:srgbClr val="000000"/>
               </a:solidFill>
@@ -5444,7 +5475,23 @@
                 <a:spcPts val="499"/>
               </a:spcBef>
             </a:pPr>
-            <a:endParaRPr b="0" lang="en-US" sz="2200" spc="-1" strike="noStrike">
+            <a:endParaRPr b="0" lang="en-US" sz="2000" spc="-1" strike="noStrike">
+              <a:solidFill>
+                <a:srgbClr val="000000"/>
+              </a:solidFill>
+              <a:latin typeface="Calibri"/>
+            </a:endParaRPr>
+          </a:p>
+          <a:p>
+            <a:pPr>
+              <a:lnSpc>
+                <a:spcPct val="90000"/>
+              </a:lnSpc>
+              <a:spcBef>
+                <a:spcPts val="499"/>
+              </a:spcBef>
+            </a:pPr>
+            <a:endParaRPr b="0" lang="en-US" sz="2000" spc="-1" strike="noStrike">
               <a:solidFill>
                 <a:srgbClr val="000000"/>
               </a:solidFill>
@@ -5480,7 +5527,7 @@
                 <a:spcPct val="100000"/>
               </a:lnSpc>
             </a:pPr>
-            <a:fld id="{35C64E03-609D-4EB1-BF64-38584A09D6E2}" type="slidenum">
+            <a:fld id="{DB2D3804-C05A-41BC-B415-4996060472C6}" type="slidenum">
               <a:rPr b="0" lang="en-US" sz="1200" spc="-1" strike="noStrike">
                 <a:solidFill>
                   <a:srgbClr val="888888"/>
@@ -5630,6 +5677,16 @@
                 <a:spcPts val="499"/>
               </a:spcBef>
             </a:pPr>
+            <a:r>
+              <a:rPr b="0" lang="en-US" sz="2400" spc="-1" strike="noStrike">
+                <a:solidFill>
+                  <a:srgbClr val="000000"/>
+                </a:solidFill>
+                <a:latin typeface="Calibri"/>
+                <a:ea typeface="Calibri"/>
+              </a:rPr>
+              <a:t>https://github.com/muzaffar1331/tls-sharp</a:t>
+            </a:r>
             <a:endParaRPr b="0" lang="en-US" sz="2400" spc="-1" strike="noStrike">
               <a:latin typeface="Arial"/>
             </a:endParaRPr>

</xml_diff>

<commit_message>
include mention of rc4
</commit_message>
<xml_diff>
--- a/hackathon-presentation-ietf105_tls13_ssh_sce_ma_dscp_le_phb.pptx
+++ b/hackathon-presentation-ietf105_tls13_ssh_sce_ma_dscp_le_phb.pptx
@@ -197,7 +197,7 @@
           <a:bodyPr lIns="0" rIns="0" tIns="0" bIns="0" anchor="b"/>
           <a:p>
             <a:pPr algn="r"/>
-            <a:fld id="{A9414B94-6B7A-4EFC-B0B5-A1C058EAC24B}" type="slidenum">
+            <a:fld id="{70AD20E5-60CD-4BE2-945B-C2C597DDD79D}" type="slidenum">
               <a:rPr b="0" lang="en-US" sz="1400" spc="-1" strike="noStrike">
                 <a:latin typeface="Times New Roman"/>
               </a:rPr>
@@ -287,7 +287,7 @@
                 <a:spcPct val="100000"/>
               </a:lnSpc>
             </a:pPr>
-            <a:fld id="{3F8B90CE-0736-431D-989C-F8CBBF291493}" type="slidenum">
+            <a:fld id="{6B731433-701D-4F7C-9400-EA1A43B51091}" type="slidenum">
               <a:rPr b="0" lang="en-US" sz="1800" spc="-1" strike="noStrike">
                 <a:solidFill>
                   <a:srgbClr val="000000"/>
@@ -295,7 +295,7 @@
                 <a:latin typeface="+mj-lt"/>
                 <a:ea typeface="+mj-ea"/>
               </a:rPr>
-              <a:t>&lt;number&gt;</a:t>
+              <a:t>1</a:t>
             </a:fld>
             <a:endParaRPr b="0" lang="en-US" sz="1800" spc="-1" strike="noStrike">
               <a:latin typeface="Times New Roman"/>
@@ -3443,7 +3443,7 @@
                 <a:spcPct val="100000"/>
               </a:lnSpc>
             </a:pPr>
-            <a:fld id="{B634E919-315F-4497-9997-1F25D200C324}" type="slidenum">
+            <a:fld id="{132AA1AC-DB12-447F-A040-7DDA96ACDF4B}" type="slidenum">
               <a:rPr b="0" lang="en-US" sz="1200" spc="-1" strike="noStrike">
                 <a:solidFill>
                   <a:srgbClr val="888888"/>
@@ -3587,7 +3587,17 @@
                 <a:latin typeface="Calibri"/>
                 <a:ea typeface="Calibri"/>
               </a:rPr>
-              <a:t>Title Text</a:t>
+              <a:t>Title </a:t>
+            </a:r>
+            <a:r>
+              <a:rPr b="0" lang="en-US" sz="4400" spc="-1" strike="noStrike">
+                <a:solidFill>
+                  <a:srgbClr val="000000"/>
+                </a:solidFill>
+                <a:latin typeface="Calibri"/>
+                <a:ea typeface="Calibri"/>
+              </a:rPr>
+              <a:t>Text</a:t>
             </a:r>
             <a:endParaRPr b="0" lang="en-US" sz="4400" spc="-1" strike="noStrike">
               <a:solidFill>
@@ -3803,7 +3813,7 @@
                 <a:spcPct val="100000"/>
               </a:lnSpc>
             </a:pPr>
-            <a:fld id="{6A69E7F5-E01D-4819-B760-2D571A8EA5A5}" type="slidenum">
+            <a:fld id="{C844B373-5719-4165-9D39-9BA342389058}" type="slidenum">
               <a:rPr b="0" lang="en-US" sz="1200" spc="-1" strike="noStrike">
                 <a:solidFill>
                   <a:srgbClr val="888888"/>
@@ -4177,7 +4187,57 @@
                 <a:latin typeface="Calibri"/>
                 <a:ea typeface="Calibri"/>
               </a:rPr>
-              <a:t>Hackathon Plan</a:t>
+              <a:t>Hac</a:t>
+            </a:r>
+            <a:r>
+              <a:rPr b="0" lang="en-US" sz="4400" spc="-1" strike="noStrike">
+                <a:solidFill>
+                  <a:srgbClr val="000000"/>
+                </a:solidFill>
+                <a:latin typeface="Calibri"/>
+                <a:ea typeface="Calibri"/>
+              </a:rPr>
+              <a:t>kat</a:t>
+            </a:r>
+            <a:r>
+              <a:rPr b="0" lang="en-US" sz="4400" spc="-1" strike="noStrike">
+                <a:solidFill>
+                  <a:srgbClr val="000000"/>
+                </a:solidFill>
+                <a:latin typeface="Calibri"/>
+                <a:ea typeface="Calibri"/>
+              </a:rPr>
+              <a:t>ho</a:t>
+            </a:r>
+            <a:r>
+              <a:rPr b="0" lang="en-US" sz="4400" spc="-1" strike="noStrike">
+                <a:solidFill>
+                  <a:srgbClr val="000000"/>
+                </a:solidFill>
+                <a:latin typeface="Calibri"/>
+                <a:ea typeface="Calibri"/>
+              </a:rPr>
+              <a:t>n </a:t>
+            </a:r>
+            <a:r>
+              <a:rPr b="0" lang="en-US" sz="4400" spc="-1" strike="noStrike">
+                <a:solidFill>
+                  <a:srgbClr val="000000"/>
+                </a:solidFill>
+                <a:latin typeface="Calibri"/>
+                <a:ea typeface="Calibri"/>
+              </a:rPr>
+              <a:t>Pla</a:t>
+            </a:r>
+            <a:r>
+              <a:rPr b="0" lang="en-US" sz="4400" spc="-1" strike="noStrike">
+                <a:solidFill>
+                  <a:srgbClr val="000000"/>
+                </a:solidFill>
+                <a:latin typeface="Calibri"/>
+                <a:ea typeface="Calibri"/>
+              </a:rPr>
+              <a:t>n</a:t>
             </a:r>
             <a:endParaRPr b="0" lang="en-US" sz="4400" spc="-1" strike="noStrike">
               <a:solidFill>
@@ -4231,7 +4291,7 @@
                 <a:latin typeface="Calibri"/>
                 <a:ea typeface="Calibri"/>
               </a:rPr>
-              <a:t>TLS 1.3 RFC446</a:t>
+              <a:t>TLS 1.3: RFC446</a:t>
             </a:r>
             <a:endParaRPr b="0" lang="en-US" sz="2400" spc="-1" strike="noStrike">
               <a:solidFill>
@@ -4262,7 +4322,7 @@
                 <a:latin typeface="Calibri"/>
                 <a:ea typeface="Calibri"/>
               </a:rPr>
-              <a:t>DSCP LE PHB RFC8622</a:t>
+              <a:t>DSCP LE PHB: RFC8622</a:t>
             </a:r>
             <a:endParaRPr b="0" lang="en-US" sz="2400" spc="-1" strike="noStrike">
               <a:solidFill>
@@ -4340,7 +4400,38 @@
                 <a:latin typeface="Calibri"/>
                 <a:ea typeface="Calibri"/>
               </a:rPr>
-              <a:t>SCE draft-morton-tsvwg-sce-00</a:t>
+              <a:t>SCE: draft-morton-tsvwg-sce-00</a:t>
+            </a:r>
+            <a:endParaRPr b="0" lang="en-US" sz="2400" spc="-1" strike="noStrike">
+              <a:solidFill>
+                <a:srgbClr val="000000"/>
+              </a:solidFill>
+              <a:latin typeface="Calibri"/>
+            </a:endParaRPr>
+          </a:p>
+          <a:p>
+            <a:pPr marL="228600" indent="-228240">
+              <a:lnSpc>
+                <a:spcPct val="90000"/>
+              </a:lnSpc>
+              <a:spcBef>
+                <a:spcPts val="499"/>
+              </a:spcBef>
+              <a:buClr>
+                <a:srgbClr val="000000"/>
+              </a:buClr>
+              <a:buFont typeface="Arial"/>
+              <a:buChar char="•"/>
+            </a:pPr>
+            <a:r>
+              <a:rPr b="0" lang="en-US" sz="2400" spc="-1" strike="noStrike">
+                <a:solidFill>
+                  <a:srgbClr val="000000"/>
+                </a:solidFill>
+                <a:latin typeface="Calibri"/>
+                <a:ea typeface="Calibri"/>
+              </a:rPr>
+              <a:t>Deprecate RC4 in SSH (draft-ietf-curdle-rc4-die-die-die-12)</a:t>
             </a:r>
             <a:endParaRPr b="0" lang="en-US" sz="2400" spc="-1" strike="noStrike">
               <a:solidFill>
@@ -4378,7 +4469,7 @@
                 <a:spcPct val="100000"/>
               </a:lnSpc>
             </a:pPr>
-            <a:fld id="{AFC55349-F9C4-4A57-AEEF-69719A771ABA}" type="slidenum">
+            <a:fld id="{EB74E796-F38A-4D1E-92F4-750CB470A0CC}" type="slidenum">
               <a:rPr b="0" lang="en-US" sz="1200" spc="-1" strike="noStrike">
                 <a:solidFill>
                   <a:srgbClr val="888888"/>
@@ -4743,7 +4834,7 @@
                 <a:spcPct val="100000"/>
               </a:lnSpc>
             </a:pPr>
-            <a:fld id="{765F1D2A-E985-41F7-8D4B-87F9307489B3}" type="slidenum">
+            <a:fld id="{DB6BD5AE-FDD5-403B-92CF-F0428BB6F180}" type="slidenum">
               <a:rPr b="0" lang="en-US" sz="1200" spc="-1" strike="noStrike">
                 <a:solidFill>
                   <a:srgbClr val="888888"/>
@@ -4997,7 +5088,7 @@
                 <a:spcPct val="100000"/>
               </a:lnSpc>
             </a:pPr>
-            <a:fld id="{85B0DB76-8854-4531-8944-EDEA5BF93F59}" type="slidenum">
+            <a:fld id="{3F90F45D-78E6-4319-8D76-667092CF726A}" type="slidenum">
               <a:rPr b="0" lang="en-US" sz="1200" spc="-1" strike="noStrike">
                 <a:solidFill>
                   <a:srgbClr val="888888"/>
@@ -5527,7 +5618,7 @@
                 <a:spcPct val="100000"/>
               </a:lnSpc>
             </a:pPr>
-            <a:fld id="{DB2D3804-C05A-41BC-B415-4996060472C6}" type="slidenum">
+            <a:fld id="{6063D90A-0FEF-4AC7-87CF-634F155EFD60}" type="slidenum">
               <a:rPr b="0" lang="en-US" sz="1200" spc="-1" strike="noStrike">
                 <a:solidFill>
                   <a:srgbClr val="888888"/>
@@ -5535,7 +5626,7 @@
                 <a:latin typeface="Calibri"/>
                 <a:ea typeface="Calibri"/>
               </a:rPr>
-              <a:t>&lt;number&gt;</a:t>
+              <a:t>1</a:t>
             </a:fld>
             <a:endParaRPr b="0" lang="en-US" sz="1200" spc="-1" strike="noStrike">
               <a:latin typeface="Times New Roman"/>

</xml_diff>